<commit_message>
Syncing before moving macs.
</commit_message>
<xml_diff>
--- a/Stages/Indoor/Medium Courses  - 20 or less/14 Rounds v1.pptx
+++ b/Stages/Indoor/Medium Courses  - 20 or less/14 Rounds v1.pptx
@@ -242,7 +242,7 @@
             <a:fld id="{6FD315A2-9F92-4CCE-886A-5EF00EA90DC0}" type="datetimeFigureOut">
               <a:rPr lang="en-US" smtClean="0"/>
               <a:pPr/>
-              <a:t>1/8/23</a:t>
+              <a:t>1/9/23</a:t>
             </a:fld>
             <a:endParaRPr lang="en-US"/>
           </a:p>
@@ -5504,8 +5504,8 @@
         </p:nvCxnSpPr>
         <p:spPr>
           <a:xfrm>
-            <a:off x="3219744" y="5638800"/>
-            <a:ext cx="963700" cy="0"/>
+            <a:off x="2286000" y="5638800"/>
+            <a:ext cx="2724756" cy="0"/>
           </a:xfrm>
           <a:prstGeom prst="line">
             <a:avLst/>
@@ -5547,8 +5547,8 @@
         </p:nvCxnSpPr>
         <p:spPr>
           <a:xfrm>
-            <a:off x="3236677" y="6248400"/>
-            <a:ext cx="963700" cy="0"/>
+            <a:off x="2286000" y="6248400"/>
+            <a:ext cx="2712056" cy="0"/>
           </a:xfrm>
           <a:prstGeom prst="line">
             <a:avLst/>
@@ -5590,7 +5590,7 @@
         </p:nvCxnSpPr>
         <p:spPr>
           <a:xfrm>
-            <a:off x="4173477" y="5638800"/>
+            <a:off x="5010756" y="5638800"/>
             <a:ext cx="0" cy="609600"/>
           </a:xfrm>
           <a:prstGeom prst="line">
@@ -5633,7 +5633,7 @@
         </p:nvCxnSpPr>
         <p:spPr>
           <a:xfrm>
-            <a:off x="3236677" y="5638800"/>
+            <a:off x="2286000" y="5638800"/>
             <a:ext cx="0" cy="609600"/>
           </a:xfrm>
           <a:prstGeom prst="line">
@@ -5674,8 +5674,8 @@
         </p:nvGrpSpPr>
         <p:grpSpPr>
           <a:xfrm rot="5400000">
-            <a:off x="3570275" y="6107219"/>
-            <a:ext cx="251974" cy="634376"/>
+            <a:off x="2384092" y="6210612"/>
+            <a:ext cx="251974" cy="448158"/>
             <a:chOff x="7022744" y="7638717"/>
             <a:chExt cx="251974" cy="646234"/>
           </a:xfrm>
@@ -6032,8 +6032,8 @@
         </p:nvSpPr>
         <p:spPr>
           <a:xfrm>
-            <a:off x="58926" y="8561550"/>
-            <a:ext cx="5827236" cy="861774"/>
+            <a:off x="63113" y="8483205"/>
+            <a:ext cx="5827236" cy="1015663"/>
           </a:xfrm>
           <a:prstGeom prst="rect">
             <a:avLst/>
@@ -6085,6 +6085,15 @@
             <a:r>
               <a:rPr lang="en-US" sz="1000" dirty="0"/>
               <a:t>Extra tall 1x2s are needed for this setup over the standard 5-footer.</a:t>
+            </a:r>
+          </a:p>
+          <a:p>
+            <a:pPr marL="228600" indent="-228600">
+              <a:buAutoNum type="arabicParenR"/>
+            </a:pPr>
+            <a:r>
+              <a:rPr lang="en-US" sz="1000" dirty="0"/>
+              <a:t>Barrels should be positions so all target can not be engaged from a single position or view.</a:t>
             </a:r>
           </a:p>
         </p:txBody>
@@ -7564,6 +7573,467 @@
           </p:sp>
         </p:grpSp>
       </p:grpSp>
+      <p:grpSp>
+        <p:nvGrpSpPr>
+          <p:cNvPr id="10" name="Group 9">
+            <a:extLst>
+              <a:ext uri="{FF2B5EF4-FFF2-40B4-BE49-F238E27FC236}">
+                <a16:creationId xmlns:a16="http://schemas.microsoft.com/office/drawing/2014/main" id="{28B2FB3F-14B3-1AAC-3EF0-8AE3523C2D93}"/>
+              </a:ext>
+            </a:extLst>
+          </p:cNvPr>
+          <p:cNvGrpSpPr/>
+          <p:nvPr/>
+        </p:nvGrpSpPr>
+        <p:grpSpPr>
+          <a:xfrm rot="5400000">
+            <a:off x="4650290" y="6210612"/>
+            <a:ext cx="251974" cy="448158"/>
+            <a:chOff x="7022744" y="7638717"/>
+            <a:chExt cx="251974" cy="646234"/>
+          </a:xfrm>
+        </p:grpSpPr>
+        <p:grpSp>
+          <p:nvGrpSpPr>
+            <p:cNvPr id="12" name="Group 11">
+              <a:extLst>
+                <a:ext uri="{FF2B5EF4-FFF2-40B4-BE49-F238E27FC236}">
+                  <a16:creationId xmlns:a16="http://schemas.microsoft.com/office/drawing/2014/main" id="{7B4EBADC-6ED4-2EB5-04E3-5443E90D800B}"/>
+                </a:ext>
+              </a:extLst>
+            </p:cNvPr>
+            <p:cNvGrpSpPr/>
+            <p:nvPr/>
+          </p:nvGrpSpPr>
+          <p:grpSpPr>
+            <a:xfrm>
+              <a:off x="7022744" y="7638717"/>
+              <a:ext cx="251974" cy="251974"/>
+              <a:chOff x="3866202" y="8284902"/>
+              <a:chExt cx="251974" cy="251974"/>
+            </a:xfrm>
+          </p:grpSpPr>
+          <p:cxnSp>
+            <p:nvCxnSpPr>
+              <p:cNvPr id="31" name="Straight Connector 30">
+                <a:extLst>
+                  <a:ext uri="{FF2B5EF4-FFF2-40B4-BE49-F238E27FC236}">
+                    <a16:creationId xmlns:a16="http://schemas.microsoft.com/office/drawing/2014/main" id="{21238CA7-6DC6-0BA4-AA6D-841DF96EEFC8}"/>
+                  </a:ext>
+                </a:extLst>
+              </p:cNvPr>
+              <p:cNvCxnSpPr>
+                <a:cxnSpLocks/>
+              </p:cNvCxnSpPr>
+              <p:nvPr/>
+            </p:nvCxnSpPr>
+            <p:spPr>
+              <a:xfrm rot="2700000">
+                <a:off x="3992189" y="8284902"/>
+                <a:ext cx="0" cy="251974"/>
+              </a:xfrm>
+              <a:prstGeom prst="line">
+                <a:avLst/>
+              </a:prstGeom>
+              <a:ln w="25400">
+                <a:solidFill>
+                  <a:schemeClr val="tx1"/>
+                </a:solidFill>
+              </a:ln>
+            </p:spPr>
+            <p:style>
+              <a:lnRef idx="1">
+                <a:schemeClr val="dk1"/>
+              </a:lnRef>
+              <a:fillRef idx="0">
+                <a:schemeClr val="dk1"/>
+              </a:fillRef>
+              <a:effectRef idx="0">
+                <a:schemeClr val="dk1"/>
+              </a:effectRef>
+              <a:fontRef idx="minor">
+                <a:schemeClr val="tx1"/>
+              </a:fontRef>
+            </p:style>
+          </p:cxnSp>
+          <p:cxnSp>
+            <p:nvCxnSpPr>
+              <p:cNvPr id="32" name="Straight Connector 31">
+                <a:extLst>
+                  <a:ext uri="{FF2B5EF4-FFF2-40B4-BE49-F238E27FC236}">
+                    <a16:creationId xmlns:a16="http://schemas.microsoft.com/office/drawing/2014/main" id="{40E38D9F-13D1-1693-1ACF-843F9C8B09DF}"/>
+                  </a:ext>
+                </a:extLst>
+              </p:cNvPr>
+              <p:cNvCxnSpPr>
+                <a:cxnSpLocks/>
+              </p:cNvCxnSpPr>
+              <p:nvPr/>
+            </p:nvCxnSpPr>
+            <p:spPr>
+              <a:xfrm rot="18900000" flipH="1">
+                <a:off x="3992189" y="8284902"/>
+                <a:ext cx="0" cy="251974"/>
+              </a:xfrm>
+              <a:prstGeom prst="line">
+                <a:avLst/>
+              </a:prstGeom>
+              <a:ln w="25400">
+                <a:solidFill>
+                  <a:schemeClr val="tx1"/>
+                </a:solidFill>
+              </a:ln>
+            </p:spPr>
+            <p:style>
+              <a:lnRef idx="1">
+                <a:schemeClr val="dk1"/>
+              </a:lnRef>
+              <a:fillRef idx="0">
+                <a:schemeClr val="dk1"/>
+              </a:fillRef>
+              <a:effectRef idx="0">
+                <a:schemeClr val="dk1"/>
+              </a:effectRef>
+              <a:fontRef idx="minor">
+                <a:schemeClr val="tx1"/>
+              </a:fontRef>
+            </p:style>
+          </p:cxnSp>
+        </p:grpSp>
+        <p:grpSp>
+          <p:nvGrpSpPr>
+            <p:cNvPr id="28" name="Group 27">
+              <a:extLst>
+                <a:ext uri="{FF2B5EF4-FFF2-40B4-BE49-F238E27FC236}">
+                  <a16:creationId xmlns:a16="http://schemas.microsoft.com/office/drawing/2014/main" id="{2788F728-0524-D834-9036-EE3B8453423B}"/>
+                </a:ext>
+              </a:extLst>
+            </p:cNvPr>
+            <p:cNvGrpSpPr/>
+            <p:nvPr/>
+          </p:nvGrpSpPr>
+          <p:grpSpPr>
+            <a:xfrm>
+              <a:off x="7022744" y="8032977"/>
+              <a:ext cx="251974" cy="251974"/>
+              <a:chOff x="3866202" y="8284902"/>
+              <a:chExt cx="251974" cy="251974"/>
+            </a:xfrm>
+          </p:grpSpPr>
+          <p:cxnSp>
+            <p:nvCxnSpPr>
+              <p:cNvPr id="29" name="Straight Connector 28">
+                <a:extLst>
+                  <a:ext uri="{FF2B5EF4-FFF2-40B4-BE49-F238E27FC236}">
+                    <a16:creationId xmlns:a16="http://schemas.microsoft.com/office/drawing/2014/main" id="{B6706E75-2FBE-3CAB-82AF-FFE64A420737}"/>
+                  </a:ext>
+                </a:extLst>
+              </p:cNvPr>
+              <p:cNvCxnSpPr>
+                <a:cxnSpLocks/>
+              </p:cNvCxnSpPr>
+              <p:nvPr/>
+            </p:nvCxnSpPr>
+            <p:spPr>
+              <a:xfrm rot="2700000">
+                <a:off x="3992189" y="8284902"/>
+                <a:ext cx="0" cy="251974"/>
+              </a:xfrm>
+              <a:prstGeom prst="line">
+                <a:avLst/>
+              </a:prstGeom>
+              <a:ln w="25400">
+                <a:solidFill>
+                  <a:schemeClr val="tx1"/>
+                </a:solidFill>
+              </a:ln>
+            </p:spPr>
+            <p:style>
+              <a:lnRef idx="1">
+                <a:schemeClr val="dk1"/>
+              </a:lnRef>
+              <a:fillRef idx="0">
+                <a:schemeClr val="dk1"/>
+              </a:fillRef>
+              <a:effectRef idx="0">
+                <a:schemeClr val="dk1"/>
+              </a:effectRef>
+              <a:fontRef idx="minor">
+                <a:schemeClr val="tx1"/>
+              </a:fontRef>
+            </p:style>
+          </p:cxnSp>
+          <p:cxnSp>
+            <p:nvCxnSpPr>
+              <p:cNvPr id="30" name="Straight Connector 29">
+                <a:extLst>
+                  <a:ext uri="{FF2B5EF4-FFF2-40B4-BE49-F238E27FC236}">
+                    <a16:creationId xmlns:a16="http://schemas.microsoft.com/office/drawing/2014/main" id="{1AB6ABFC-225F-35AE-C284-AE3F8BF6CB5F}"/>
+                  </a:ext>
+                </a:extLst>
+              </p:cNvPr>
+              <p:cNvCxnSpPr>
+                <a:cxnSpLocks/>
+              </p:cNvCxnSpPr>
+              <p:nvPr/>
+            </p:nvCxnSpPr>
+            <p:spPr>
+              <a:xfrm rot="18900000" flipH="1">
+                <a:off x="3992189" y="8284902"/>
+                <a:ext cx="0" cy="251974"/>
+              </a:xfrm>
+              <a:prstGeom prst="line">
+                <a:avLst/>
+              </a:prstGeom>
+              <a:ln w="25400">
+                <a:solidFill>
+                  <a:schemeClr val="tx1"/>
+                </a:solidFill>
+              </a:ln>
+            </p:spPr>
+            <p:style>
+              <a:lnRef idx="1">
+                <a:schemeClr val="dk1"/>
+              </a:lnRef>
+              <a:fillRef idx="0">
+                <a:schemeClr val="dk1"/>
+              </a:fillRef>
+              <a:effectRef idx="0">
+                <a:schemeClr val="dk1"/>
+              </a:effectRef>
+              <a:fontRef idx="minor">
+                <a:schemeClr val="tx1"/>
+              </a:fontRef>
+            </p:style>
+          </p:cxnSp>
+        </p:grpSp>
+      </p:grpSp>
+      <p:grpSp>
+        <p:nvGrpSpPr>
+          <p:cNvPr id="33" name="Group 32">
+            <a:extLst>
+              <a:ext uri="{FF2B5EF4-FFF2-40B4-BE49-F238E27FC236}">
+                <a16:creationId xmlns:a16="http://schemas.microsoft.com/office/drawing/2014/main" id="{B6D39010-8326-0220-199C-0FB7B9D9FD9D}"/>
+              </a:ext>
+            </a:extLst>
+          </p:cNvPr>
+          <p:cNvGrpSpPr/>
+          <p:nvPr/>
+        </p:nvGrpSpPr>
+        <p:grpSpPr>
+          <a:xfrm>
+            <a:off x="2936913" y="3147273"/>
+            <a:ext cx="329764" cy="1280588"/>
+            <a:chOff x="3224405" y="197325"/>
+            <a:chExt cx="329764" cy="1280588"/>
+          </a:xfrm>
+        </p:grpSpPr>
+        <p:sp>
+          <p:nvSpPr>
+            <p:cNvPr id="34" name="AutoShape 713">
+              <a:extLst>
+                <a:ext uri="{FF2B5EF4-FFF2-40B4-BE49-F238E27FC236}">
+                  <a16:creationId xmlns:a16="http://schemas.microsoft.com/office/drawing/2014/main" id="{D2E410ED-DA52-7A78-1D93-F28A7B73C32B}"/>
+                </a:ext>
+              </a:extLst>
+            </p:cNvPr>
+            <p:cNvSpPr>
+              <a:spLocks noChangeArrowheads="1"/>
+            </p:cNvSpPr>
+            <p:nvPr/>
+          </p:nvSpPr>
+          <p:spPr bwMode="auto">
+            <a:xfrm>
+              <a:off x="3224405" y="759833"/>
+              <a:ext cx="328613" cy="718080"/>
+            </a:xfrm>
+            <a:prstGeom prst="can">
+              <a:avLst>
+                <a:gd name="adj" fmla="val 49879"/>
+              </a:avLst>
+            </a:prstGeom>
+            <a:solidFill>
+              <a:srgbClr val="69E2FF">
+                <a:alpha val="50195"/>
+              </a:srgbClr>
+            </a:solidFill>
+            <a:ln w="9525">
+              <a:solidFill>
+                <a:schemeClr val="tx1"/>
+              </a:solidFill>
+              <a:round/>
+              <a:headEnd/>
+              <a:tailEnd/>
+            </a:ln>
+          </p:spPr>
+          <p:txBody>
+            <a:bodyPr wrap="none" anchor="ctr"/>
+            <a:lstStyle/>
+            <a:p>
+              <a:endParaRPr lang="en-US"/>
+            </a:p>
+          </p:txBody>
+        </p:sp>
+        <p:sp>
+          <p:nvSpPr>
+            <p:cNvPr id="35" name="AutoShape 713">
+              <a:extLst>
+                <a:ext uri="{FF2B5EF4-FFF2-40B4-BE49-F238E27FC236}">
+                  <a16:creationId xmlns:a16="http://schemas.microsoft.com/office/drawing/2014/main" id="{B0CA9796-7F8F-A394-9A6F-8C9B7B0C4509}"/>
+                </a:ext>
+              </a:extLst>
+            </p:cNvPr>
+            <p:cNvSpPr>
+              <a:spLocks noChangeArrowheads="1"/>
+            </p:cNvSpPr>
+            <p:nvPr/>
+          </p:nvSpPr>
+          <p:spPr bwMode="auto">
+            <a:xfrm>
+              <a:off x="3225556" y="197325"/>
+              <a:ext cx="328613" cy="718080"/>
+            </a:xfrm>
+            <a:prstGeom prst="can">
+              <a:avLst>
+                <a:gd name="adj" fmla="val 49879"/>
+              </a:avLst>
+            </a:prstGeom>
+            <a:solidFill>
+              <a:srgbClr val="69E2FF">
+                <a:alpha val="50195"/>
+              </a:srgbClr>
+            </a:solidFill>
+            <a:ln w="9525">
+              <a:solidFill>
+                <a:schemeClr val="tx1"/>
+              </a:solidFill>
+              <a:round/>
+              <a:headEnd/>
+              <a:tailEnd/>
+            </a:ln>
+          </p:spPr>
+          <p:txBody>
+            <a:bodyPr wrap="none" anchor="ctr"/>
+            <a:lstStyle/>
+            <a:p>
+              <a:endParaRPr lang="en-US"/>
+            </a:p>
+          </p:txBody>
+        </p:sp>
+      </p:grpSp>
+      <p:grpSp>
+        <p:nvGrpSpPr>
+          <p:cNvPr id="36" name="Group 35">
+            <a:extLst>
+              <a:ext uri="{FF2B5EF4-FFF2-40B4-BE49-F238E27FC236}">
+                <a16:creationId xmlns:a16="http://schemas.microsoft.com/office/drawing/2014/main" id="{3D996A7D-E764-9879-213B-51098CE0BA8B}"/>
+              </a:ext>
+            </a:extLst>
+          </p:cNvPr>
+          <p:cNvGrpSpPr/>
+          <p:nvPr/>
+        </p:nvGrpSpPr>
+        <p:grpSpPr>
+          <a:xfrm>
+            <a:off x="4108123" y="3135004"/>
+            <a:ext cx="329764" cy="1280588"/>
+            <a:chOff x="3224405" y="197325"/>
+            <a:chExt cx="329764" cy="1280588"/>
+          </a:xfrm>
+        </p:grpSpPr>
+        <p:sp>
+          <p:nvSpPr>
+            <p:cNvPr id="37" name="AutoShape 713">
+              <a:extLst>
+                <a:ext uri="{FF2B5EF4-FFF2-40B4-BE49-F238E27FC236}">
+                  <a16:creationId xmlns:a16="http://schemas.microsoft.com/office/drawing/2014/main" id="{F04276F7-5401-F725-C0E3-2F2CF3670E80}"/>
+                </a:ext>
+              </a:extLst>
+            </p:cNvPr>
+            <p:cNvSpPr>
+              <a:spLocks noChangeArrowheads="1"/>
+            </p:cNvSpPr>
+            <p:nvPr/>
+          </p:nvSpPr>
+          <p:spPr bwMode="auto">
+            <a:xfrm>
+              <a:off x="3224405" y="759833"/>
+              <a:ext cx="328613" cy="718080"/>
+            </a:xfrm>
+            <a:prstGeom prst="can">
+              <a:avLst>
+                <a:gd name="adj" fmla="val 49879"/>
+              </a:avLst>
+            </a:prstGeom>
+            <a:solidFill>
+              <a:srgbClr val="69E2FF">
+                <a:alpha val="50195"/>
+              </a:srgbClr>
+            </a:solidFill>
+            <a:ln w="9525">
+              <a:solidFill>
+                <a:schemeClr val="tx1"/>
+              </a:solidFill>
+              <a:round/>
+              <a:headEnd/>
+              <a:tailEnd/>
+            </a:ln>
+          </p:spPr>
+          <p:txBody>
+            <a:bodyPr wrap="none" anchor="ctr"/>
+            <a:lstStyle/>
+            <a:p>
+              <a:endParaRPr lang="en-US"/>
+            </a:p>
+          </p:txBody>
+        </p:sp>
+        <p:sp>
+          <p:nvSpPr>
+            <p:cNvPr id="38" name="AutoShape 713">
+              <a:extLst>
+                <a:ext uri="{FF2B5EF4-FFF2-40B4-BE49-F238E27FC236}">
+                  <a16:creationId xmlns:a16="http://schemas.microsoft.com/office/drawing/2014/main" id="{2BCFA5BF-51B0-7C92-9BDF-64FE5B1F67E9}"/>
+                </a:ext>
+              </a:extLst>
+            </p:cNvPr>
+            <p:cNvSpPr>
+              <a:spLocks noChangeArrowheads="1"/>
+            </p:cNvSpPr>
+            <p:nvPr/>
+          </p:nvSpPr>
+          <p:spPr bwMode="auto">
+            <a:xfrm>
+              <a:off x="3225556" y="197325"/>
+              <a:ext cx="328613" cy="718080"/>
+            </a:xfrm>
+            <a:prstGeom prst="can">
+              <a:avLst>
+                <a:gd name="adj" fmla="val 49879"/>
+              </a:avLst>
+            </a:prstGeom>
+            <a:solidFill>
+              <a:srgbClr val="69E2FF">
+                <a:alpha val="50195"/>
+              </a:srgbClr>
+            </a:solidFill>
+            <a:ln w="9525">
+              <a:solidFill>
+                <a:schemeClr val="tx1"/>
+              </a:solidFill>
+              <a:round/>
+              <a:headEnd/>
+              <a:tailEnd/>
+            </a:ln>
+          </p:spPr>
+          <p:txBody>
+            <a:bodyPr wrap="none" anchor="ctr"/>
+            <a:lstStyle/>
+            <a:p>
+              <a:endParaRPr lang="en-US"/>
+            </a:p>
+          </p:txBody>
+        </p:sp>
+      </p:grpSp>
     </p:spTree>
     <p:extLst>
       <p:ext uri="{BB962C8B-B14F-4D97-AF65-F5344CB8AC3E}">

</xml_diff>